<commit_message>
change file structure, populate 01_create-features
</commit_message>
<xml_diff>
--- a/talks/20200424_lab-mtg.pptx
+++ b/talks/20200424_lab-mtg.pptx
@@ -5,13 +5,14 @@
     <p:sldMasterId id="2147483648" r:id="rId1"/>
   </p:sldMasterIdLst>
   <p:sldIdLst>
-    <p:sldId id="256" r:id="rId2"/>
-    <p:sldId id="257" r:id="rId3"/>
-    <p:sldId id="259" r:id="rId4"/>
-    <p:sldId id="261" r:id="rId5"/>
-    <p:sldId id="260" r:id="rId6"/>
-    <p:sldId id="258" r:id="rId7"/>
-    <p:sldId id="262" r:id="rId8"/>
+    <p:sldId id="263" r:id="rId2"/>
+    <p:sldId id="256" r:id="rId3"/>
+    <p:sldId id="257" r:id="rId4"/>
+    <p:sldId id="259" r:id="rId5"/>
+    <p:sldId id="261" r:id="rId6"/>
+    <p:sldId id="260" r:id="rId7"/>
+    <p:sldId id="258" r:id="rId8"/>
+    <p:sldId id="262" r:id="rId9"/>
   </p:sldIdLst>
   <p:sldSz cx="12192000" cy="6858000"/>
   <p:notesSz cx="6858000" cy="9144000"/>
@@ -110,6 +111,11 @@
       </a:defRPr>
     </a:lvl9pPr>
   </p:defaultTextStyle>
+  <p:extLst>
+    <p:ext uri="{EFAFB233-063F-42B5-8137-9DF3F51BA10A}">
+      <p15:sldGuideLst xmlns:p15="http://schemas.microsoft.com/office/powerpoint/2012/main"/>
+    </p:ext>
+  </p:extLst>
 </p:presentation>
 </file>
 
@@ -260,7 +266,7 @@
           <a:p>
             <a:fld id="{984C88B1-6B14-416E-9154-75B67ED9E703}" type="datetimeFigureOut">
               <a:rPr lang="en-US" smtClean="0"/>
-              <a:t>4/23/2020</a:t>
+              <a:t>4/24/2020</a:t>
             </a:fld>
             <a:endParaRPr lang="en-US"/>
           </a:p>
@@ -458,7 +464,7 @@
           <a:p>
             <a:fld id="{984C88B1-6B14-416E-9154-75B67ED9E703}" type="datetimeFigureOut">
               <a:rPr lang="en-US" smtClean="0"/>
-              <a:t>4/23/2020</a:t>
+              <a:t>4/24/2020</a:t>
             </a:fld>
             <a:endParaRPr lang="en-US"/>
           </a:p>
@@ -666,7 +672,7 @@
           <a:p>
             <a:fld id="{984C88B1-6B14-416E-9154-75B67ED9E703}" type="datetimeFigureOut">
               <a:rPr lang="en-US" smtClean="0"/>
-              <a:t>4/23/2020</a:t>
+              <a:t>4/24/2020</a:t>
             </a:fld>
             <a:endParaRPr lang="en-US"/>
           </a:p>
@@ -864,7 +870,7 @@
           <a:p>
             <a:fld id="{984C88B1-6B14-416E-9154-75B67ED9E703}" type="datetimeFigureOut">
               <a:rPr lang="en-US" smtClean="0"/>
-              <a:t>4/23/2020</a:t>
+              <a:t>4/24/2020</a:t>
             </a:fld>
             <a:endParaRPr lang="en-US"/>
           </a:p>
@@ -1139,7 +1145,7 @@
           <a:p>
             <a:fld id="{984C88B1-6B14-416E-9154-75B67ED9E703}" type="datetimeFigureOut">
               <a:rPr lang="en-US" smtClean="0"/>
-              <a:t>4/23/2020</a:t>
+              <a:t>4/24/2020</a:t>
             </a:fld>
             <a:endParaRPr lang="en-US"/>
           </a:p>
@@ -1404,7 +1410,7 @@
           <a:p>
             <a:fld id="{984C88B1-6B14-416E-9154-75B67ED9E703}" type="datetimeFigureOut">
               <a:rPr lang="en-US" smtClean="0"/>
-              <a:t>4/23/2020</a:t>
+              <a:t>4/24/2020</a:t>
             </a:fld>
             <a:endParaRPr lang="en-US"/>
           </a:p>
@@ -1816,7 +1822,7 @@
           <a:p>
             <a:fld id="{984C88B1-6B14-416E-9154-75B67ED9E703}" type="datetimeFigureOut">
               <a:rPr lang="en-US" smtClean="0"/>
-              <a:t>4/23/2020</a:t>
+              <a:t>4/24/2020</a:t>
             </a:fld>
             <a:endParaRPr lang="en-US"/>
           </a:p>
@@ -1957,7 +1963,7 @@
           <a:p>
             <a:fld id="{984C88B1-6B14-416E-9154-75B67ED9E703}" type="datetimeFigureOut">
               <a:rPr lang="en-US" smtClean="0"/>
-              <a:t>4/23/2020</a:t>
+              <a:t>4/24/2020</a:t>
             </a:fld>
             <a:endParaRPr lang="en-US"/>
           </a:p>
@@ -2070,7 +2076,7 @@
           <a:p>
             <a:fld id="{984C88B1-6B14-416E-9154-75B67ED9E703}" type="datetimeFigureOut">
               <a:rPr lang="en-US" smtClean="0"/>
-              <a:t>4/23/2020</a:t>
+              <a:t>4/24/2020</a:t>
             </a:fld>
             <a:endParaRPr lang="en-US"/>
           </a:p>
@@ -2381,7 +2387,7 @@
           <a:p>
             <a:fld id="{984C88B1-6B14-416E-9154-75B67ED9E703}" type="datetimeFigureOut">
               <a:rPr lang="en-US" smtClean="0"/>
-              <a:t>4/23/2020</a:t>
+              <a:t>4/24/2020</a:t>
             </a:fld>
             <a:endParaRPr lang="en-US"/>
           </a:p>
@@ -2669,7 +2675,7 @@
           <a:p>
             <a:fld id="{984C88B1-6B14-416E-9154-75B67ED9E703}" type="datetimeFigureOut">
               <a:rPr lang="en-US" smtClean="0"/>
-              <a:t>4/23/2020</a:t>
+              <a:t>4/24/2020</a:t>
             </a:fld>
             <a:endParaRPr lang="en-US"/>
           </a:p>
@@ -2910,7 +2916,7 @@
           <a:p>
             <a:fld id="{984C88B1-6B14-416E-9154-75B67ED9E703}" type="datetimeFigureOut">
               <a:rPr lang="en-US" smtClean="0"/>
-              <a:t>4/23/2020</a:t>
+              <a:t>4/24/2020</a:t>
             </a:fld>
             <a:endParaRPr lang="en-US"/>
           </a:p>
@@ -3327,108 +3333,24 @@
           <a:chExt cx="0" cy="0"/>
         </a:xfrm>
       </p:grpSpPr>
-      <p:sp>
-        <p:nvSpPr>
-          <p:cNvPr id="2" name="Title 1">
-            <a:extLst>
-              <a:ext uri="{FF2B5EF4-FFF2-40B4-BE49-F238E27FC236}">
-                <a16:creationId xmlns:a16="http://schemas.microsoft.com/office/drawing/2014/main" id="{A5DECC40-98A4-4EBA-91B6-45BBAAEC9EA9}"/>
-              </a:ext>
-            </a:extLst>
-          </p:cNvPr>
-          <p:cNvSpPr>
-            <a:spLocks noGrp="1"/>
-          </p:cNvSpPr>
-          <p:nvPr>
-            <p:ph type="ctrTitle"/>
-          </p:nvPr>
-        </p:nvSpPr>
-        <p:spPr/>
-        <p:txBody>
-          <a:bodyPr/>
-          <a:lstStyle/>
-          <a:p>
-            <a:endParaRPr lang="en-US"/>
-          </a:p>
-        </p:txBody>
-      </p:sp>
-      <p:sp>
-        <p:nvSpPr>
-          <p:cNvPr id="3" name="Subtitle 2">
-            <a:extLst>
-              <a:ext uri="{FF2B5EF4-FFF2-40B4-BE49-F238E27FC236}">
-                <a16:creationId xmlns:a16="http://schemas.microsoft.com/office/drawing/2014/main" id="{5629781D-B566-441B-B5B6-61445EFBD95F}"/>
-              </a:ext>
-            </a:extLst>
-          </p:cNvPr>
-          <p:cNvSpPr>
-            <a:spLocks noGrp="1"/>
-          </p:cNvSpPr>
-          <p:nvPr>
-            <p:ph type="subTitle" idx="1"/>
-          </p:nvPr>
-        </p:nvSpPr>
-        <p:spPr/>
-        <p:txBody>
-          <a:bodyPr/>
-          <a:lstStyle/>
-          <a:p>
-            <a:endParaRPr lang="en-US"/>
-          </a:p>
-        </p:txBody>
-      </p:sp>
-      <p:pic>
-        <p:nvPicPr>
-          <p:cNvPr id="5" name="Picture 4">
-            <a:extLst>
-              <a:ext uri="{FF2B5EF4-FFF2-40B4-BE49-F238E27FC236}">
-                <a16:creationId xmlns:a16="http://schemas.microsoft.com/office/drawing/2014/main" id="{02974C42-39BF-4053-94AC-F4E9D88D477E}"/>
-              </a:ext>
-            </a:extLst>
-          </p:cNvPr>
-          <p:cNvPicPr>
-            <a:picLocks noChangeAspect="1"/>
-          </p:cNvPicPr>
-          <p:nvPr/>
-        </p:nvPicPr>
-        <p:blipFill>
-          <a:blip r:embed="rId2">
-            <a:extLst>
-              <a:ext uri="{28A0092B-C50C-407E-A947-70E740481C1C}">
-                <a14:useLocalDpi xmlns:a14="http://schemas.microsoft.com/office/drawing/2010/main" val="0"/>
-              </a:ext>
-            </a:extLst>
-          </a:blip>
-          <a:stretch>
-            <a:fillRect/>
-          </a:stretch>
-        </p:blipFill>
-        <p:spPr>
-          <a:xfrm>
-            <a:off x="161188" y="178643"/>
-            <a:ext cx="10875322" cy="6662640"/>
-          </a:xfrm>
-          <a:prstGeom prst="rect">
-            <a:avLst/>
-          </a:prstGeom>
-        </p:spPr>
-      </p:pic>
       <p:cxnSp>
         <p:nvCxnSpPr>
-          <p:cNvPr id="9" name="Straight Connector 8">
-            <a:extLst>
-              <a:ext uri="{FF2B5EF4-FFF2-40B4-BE49-F238E27FC236}">
-                <a16:creationId xmlns:a16="http://schemas.microsoft.com/office/drawing/2014/main" id="{4CC1E0AA-0887-4C07-81A0-4546A2540C37}"/>
-              </a:ext>
-            </a:extLst>
-          </p:cNvPr>
-          <p:cNvCxnSpPr/>
+          <p:cNvPr id="4" name="Straight Connector 3">
+            <a:extLst>
+              <a:ext uri="{FF2B5EF4-FFF2-40B4-BE49-F238E27FC236}">
+                <a16:creationId xmlns:a16="http://schemas.microsoft.com/office/drawing/2014/main" id="{824FCCEA-D2F2-4135-9063-6E43591AB382}"/>
+              </a:ext>
+            </a:extLst>
+          </p:cNvPr>
+          <p:cNvCxnSpPr>
+            <a:cxnSpLocks/>
+          </p:cNvCxnSpPr>
           <p:nvPr/>
         </p:nvCxnSpPr>
         <p:spPr>
           <a:xfrm flipV="1">
-            <a:off x="9543495" y="1012054"/>
-            <a:ext cx="923278" cy="213064"/>
+            <a:off x="748432" y="5238147"/>
+            <a:ext cx="5780211" cy="540089"/>
           </a:xfrm>
           <a:prstGeom prst="line">
             <a:avLst/>
@@ -3456,10 +3378,10 @@
       </p:cxnSp>
       <p:cxnSp>
         <p:nvCxnSpPr>
-          <p:cNvPr id="10" name="Straight Connector 9">
-            <a:extLst>
-              <a:ext uri="{FF2B5EF4-FFF2-40B4-BE49-F238E27FC236}">
-                <a16:creationId xmlns:a16="http://schemas.microsoft.com/office/drawing/2014/main" id="{D9493C27-E6BC-44E3-BD27-AD183FE699B2}"/>
+          <p:cNvPr id="5" name="Straight Connector 4">
+            <a:extLst>
+              <a:ext uri="{FF2B5EF4-FFF2-40B4-BE49-F238E27FC236}">
+                <a16:creationId xmlns:a16="http://schemas.microsoft.com/office/drawing/2014/main" id="{EEE0D90A-20D4-43FD-9B6B-23C7BD0EB01D}"/>
               </a:ext>
             </a:extLst>
           </p:cNvPr>
@@ -3470,8 +3392,8 @@
         </p:nvCxnSpPr>
         <p:spPr>
           <a:xfrm flipV="1">
-            <a:off x="10484528" y="178643"/>
-            <a:ext cx="612559" cy="833411"/>
+            <a:off x="6528643" y="604449"/>
+            <a:ext cx="4121003" cy="4633697"/>
           </a:xfrm>
           <a:prstGeom prst="line">
             <a:avLst/>
@@ -3499,10 +3421,10 @@
       </p:cxnSp>
       <p:sp>
         <p:nvSpPr>
-          <p:cNvPr id="12" name="TextBox 11">
-            <a:extLst>
-              <a:ext uri="{FF2B5EF4-FFF2-40B4-BE49-F238E27FC236}">
-                <a16:creationId xmlns:a16="http://schemas.microsoft.com/office/drawing/2014/main" id="{7FEE85ED-B909-48BD-AD1E-8A63C7405EC5}"/>
+          <p:cNvPr id="6" name="TextBox 5">
+            <a:extLst>
+              <a:ext uri="{FF2B5EF4-FFF2-40B4-BE49-F238E27FC236}">
+                <a16:creationId xmlns:a16="http://schemas.microsoft.com/office/drawing/2014/main" id="{2063FD3C-0452-4138-B201-25014548A21D}"/>
               </a:ext>
             </a:extLst>
           </p:cNvPr>
@@ -3511,8 +3433,8 @@
         </p:nvSpPr>
         <p:spPr>
           <a:xfrm>
-            <a:off x="9512247" y="1232465"/>
-            <a:ext cx="1256049" cy="369332"/>
+            <a:off x="748432" y="5778236"/>
+            <a:ext cx="1542007" cy="377666"/>
           </a:xfrm>
           <a:prstGeom prst="rect">
             <a:avLst/>
@@ -3520,7 +3442,7 @@
           <a:noFill/>
         </p:spPr>
         <p:txBody>
-          <a:bodyPr wrap="none" rtlCol="0">
+          <a:bodyPr wrap="square" rtlCol="0">
             <a:spAutoFit/>
           </a:bodyPr>
           <a:lstStyle/>
@@ -3538,10 +3460,10 @@
       </p:sp>
       <p:sp>
         <p:nvSpPr>
-          <p:cNvPr id="13" name="TextBox 12">
-            <a:extLst>
-              <a:ext uri="{FF2B5EF4-FFF2-40B4-BE49-F238E27FC236}">
-                <a16:creationId xmlns:a16="http://schemas.microsoft.com/office/drawing/2014/main" id="{9065B989-CA45-47C8-9C4F-C23DC62E0779}"/>
+          <p:cNvPr id="7" name="TextBox 6">
+            <a:extLst>
+              <a:ext uri="{FF2B5EF4-FFF2-40B4-BE49-F238E27FC236}">
+                <a16:creationId xmlns:a16="http://schemas.microsoft.com/office/drawing/2014/main" id="{C602AE53-9760-4900-9B4C-EBDE47668DF7}"/>
               </a:ext>
             </a:extLst>
           </p:cNvPr>
@@ -3550,8 +3472,8 @@
         </p:nvSpPr>
         <p:spPr>
           <a:xfrm>
-            <a:off x="9388890" y="726061"/>
-            <a:ext cx="877163" cy="369332"/>
+            <a:off x="3248589" y="4882454"/>
+            <a:ext cx="941671" cy="369332"/>
           </a:xfrm>
           <a:prstGeom prst="rect">
             <a:avLst/>
@@ -3559,7 +3481,7 @@
           <a:noFill/>
         </p:spPr>
         <p:txBody>
-          <a:bodyPr wrap="none" rtlCol="0">
+          <a:bodyPr wrap="square" rtlCol="0">
             <a:spAutoFit/>
           </a:bodyPr>
           <a:lstStyle/>
@@ -3577,10 +3499,10 @@
       </p:sp>
       <p:sp>
         <p:nvSpPr>
-          <p:cNvPr id="14" name="TextBox 13">
-            <a:extLst>
-              <a:ext uri="{FF2B5EF4-FFF2-40B4-BE49-F238E27FC236}">
-                <a16:creationId xmlns:a16="http://schemas.microsoft.com/office/drawing/2014/main" id="{74D5D087-E910-4641-801B-BE98D8629E42}"/>
+          <p:cNvPr id="8" name="TextBox 7">
+            <a:extLst>
+              <a:ext uri="{FF2B5EF4-FFF2-40B4-BE49-F238E27FC236}">
+                <a16:creationId xmlns:a16="http://schemas.microsoft.com/office/drawing/2014/main" id="{E582E51E-D96C-42C3-AEFA-4088EE843448}"/>
               </a:ext>
             </a:extLst>
           </p:cNvPr>
@@ -3589,8 +3511,8 @@
         </p:nvSpPr>
         <p:spPr>
           <a:xfrm>
-            <a:off x="10462443" y="188709"/>
-            <a:ext cx="853119" cy="369332"/>
+            <a:off x="7684523" y="2139752"/>
+            <a:ext cx="5739359" cy="2053455"/>
           </a:xfrm>
           <a:prstGeom prst="rect">
             <a:avLst/>
@@ -3616,10 +3538,10 @@
       </p:sp>
       <p:sp>
         <p:nvSpPr>
-          <p:cNvPr id="15" name="TextBox 14">
-            <a:extLst>
-              <a:ext uri="{FF2B5EF4-FFF2-40B4-BE49-F238E27FC236}">
-                <a16:creationId xmlns:a16="http://schemas.microsoft.com/office/drawing/2014/main" id="{B13EC12B-AA94-476A-B2A2-E17979CDBBA2}"/>
+          <p:cNvPr id="9" name="TextBox 8">
+            <a:extLst>
+              <a:ext uri="{FF2B5EF4-FFF2-40B4-BE49-F238E27FC236}">
+                <a16:creationId xmlns:a16="http://schemas.microsoft.com/office/drawing/2014/main" id="{9E9E3FC9-01F7-4280-8F5F-09F985F105F7}"/>
               </a:ext>
             </a:extLst>
           </p:cNvPr>
@@ -3628,8 +3550,8 @@
         </p:nvSpPr>
         <p:spPr>
           <a:xfrm>
-            <a:off x="10484528" y="901952"/>
-            <a:ext cx="1504771" cy="369332"/>
+            <a:off x="6528643" y="5279965"/>
+            <a:ext cx="1802557" cy="369332"/>
           </a:xfrm>
           <a:prstGeom prst="rect">
             <a:avLst/>
@@ -3637,7 +3559,7 @@
           <a:noFill/>
         </p:spPr>
         <p:txBody>
-          <a:bodyPr wrap="none" rtlCol="0">
+          <a:bodyPr wrap="square" rtlCol="0">
             <a:spAutoFit/>
           </a:bodyPr>
           <a:lstStyle/>
@@ -3661,88 +3583,96 @@
           </a:p>
         </p:txBody>
       </p:sp>
-      <p:sp>
-        <p:nvSpPr>
-          <p:cNvPr id="16" name="TextBox 15">
-            <a:extLst>
-              <a:ext uri="{FF2B5EF4-FFF2-40B4-BE49-F238E27FC236}">
-                <a16:creationId xmlns:a16="http://schemas.microsoft.com/office/drawing/2014/main" id="{F6BAC719-C233-4CD7-9A29-F9B87D6A88B1}"/>
-              </a:ext>
-            </a:extLst>
-          </p:cNvPr>
-          <p:cNvSpPr txBox="1"/>
+      <p:cxnSp>
+        <p:nvCxnSpPr>
+          <p:cNvPr id="12" name="Straight Arrow Connector 11">
+            <a:extLst>
+              <a:ext uri="{FF2B5EF4-FFF2-40B4-BE49-F238E27FC236}">
+                <a16:creationId xmlns:a16="http://schemas.microsoft.com/office/drawing/2014/main" id="{5E49F642-EF9C-41E4-AB2C-15C88BF4FE09}"/>
+              </a:ext>
+            </a:extLst>
+          </p:cNvPr>
+          <p:cNvCxnSpPr/>
           <p:nvPr/>
-        </p:nvSpPr>
-        <p:spPr>
-          <a:xfrm>
-            <a:off x="1729557" y="96505"/>
-            <a:ext cx="3613211" cy="369332"/>
-          </a:xfrm>
-          <a:prstGeom prst="rect">
+        </p:nvCxnSpPr>
+        <p:spPr>
+          <a:xfrm flipV="1">
+            <a:off x="506027" y="514905"/>
+            <a:ext cx="0" cy="5619024"/>
+          </a:xfrm>
+          <a:prstGeom prst="straightConnector1">
             <a:avLst/>
           </a:prstGeom>
-          <a:noFill/>
-        </p:spPr>
-        <p:txBody>
-          <a:bodyPr wrap="square" rtlCol="0">
-            <a:spAutoFit/>
-          </a:bodyPr>
-          <a:lstStyle/>
-          <a:p>
-            <a:r>
-              <a:rPr lang="en-US" dirty="0">
-                <a:solidFill>
-                  <a:srgbClr val="FF0000"/>
-                </a:solidFill>
-              </a:rPr>
-              <a:t>intercept, leaching at 0N</a:t>
-            </a:r>
-          </a:p>
-        </p:txBody>
-      </p:sp>
-      <p:sp>
-        <p:nvSpPr>
-          <p:cNvPr id="17" name="TextBox 16">
-            <a:extLst>
-              <a:ext uri="{FF2B5EF4-FFF2-40B4-BE49-F238E27FC236}">
-                <a16:creationId xmlns:a16="http://schemas.microsoft.com/office/drawing/2014/main" id="{C4344367-6107-47B3-AEEA-8B33ED400C6B}"/>
-              </a:ext>
-            </a:extLst>
-          </p:cNvPr>
-          <p:cNvSpPr txBox="1"/>
+          <a:ln>
+            <a:solidFill>
+              <a:schemeClr val="tx1"/>
+            </a:solidFill>
+            <a:tailEnd type="triangle"/>
+          </a:ln>
+        </p:spPr>
+        <p:style>
+          <a:lnRef idx="1">
+            <a:schemeClr val="accent1"/>
+          </a:lnRef>
+          <a:fillRef idx="0">
+            <a:schemeClr val="accent1"/>
+          </a:fillRef>
+          <a:effectRef idx="0">
+            <a:schemeClr val="accent1"/>
+          </a:effectRef>
+          <a:fontRef idx="minor">
+            <a:schemeClr val="tx1"/>
+          </a:fontRef>
+        </p:style>
+      </p:cxnSp>
+      <p:cxnSp>
+        <p:nvCxnSpPr>
+          <p:cNvPr id="13" name="Straight Arrow Connector 12">
+            <a:extLst>
+              <a:ext uri="{FF2B5EF4-FFF2-40B4-BE49-F238E27FC236}">
+                <a16:creationId xmlns:a16="http://schemas.microsoft.com/office/drawing/2014/main" id="{C827F654-0964-40C9-8D66-8D04FF5DD01E}"/>
+              </a:ext>
+            </a:extLst>
+          </p:cNvPr>
+          <p:cNvCxnSpPr>
+            <a:cxnSpLocks/>
+          </p:cNvCxnSpPr>
           <p:nvPr/>
-        </p:nvSpPr>
+        </p:nvCxnSpPr>
         <p:spPr>
           <a:xfrm>
-            <a:off x="7039725" y="52229"/>
-            <a:ext cx="1206356" cy="369332"/>
-          </a:xfrm>
-          <a:prstGeom prst="rect">
+            <a:off x="463114" y="6170915"/>
+            <a:ext cx="9470994" cy="0"/>
+          </a:xfrm>
+          <a:prstGeom prst="straightConnector1">
             <a:avLst/>
           </a:prstGeom>
-          <a:noFill/>
-        </p:spPr>
-        <p:txBody>
-          <a:bodyPr wrap="none" rtlCol="0">
-            <a:spAutoFit/>
-          </a:bodyPr>
-          <a:lstStyle/>
-          <a:p>
-            <a:r>
-              <a:rPr lang="en-US" dirty="0">
-                <a:solidFill>
-                  <a:srgbClr val="FF0000"/>
-                </a:solidFill>
-              </a:rPr>
-              <a:t>pivot point</a:t>
-            </a:r>
-          </a:p>
-        </p:txBody>
-      </p:sp>
+          <a:ln>
+            <a:solidFill>
+              <a:schemeClr val="tx1"/>
+            </a:solidFill>
+            <a:tailEnd type="triangle"/>
+          </a:ln>
+        </p:spPr>
+        <p:style>
+          <a:lnRef idx="1">
+            <a:schemeClr val="accent1"/>
+          </a:lnRef>
+          <a:fillRef idx="0">
+            <a:schemeClr val="accent1"/>
+          </a:fillRef>
+          <a:effectRef idx="0">
+            <a:schemeClr val="accent1"/>
+          </a:effectRef>
+          <a:fontRef idx="minor">
+            <a:schemeClr val="tx1"/>
+          </a:fontRef>
+        </p:style>
+      </p:cxnSp>
     </p:spTree>
     <p:extLst>
       <p:ext uri="{BB962C8B-B14F-4D97-AF65-F5344CB8AC3E}">
-        <p14:creationId xmlns:p14="http://schemas.microsoft.com/office/powerpoint/2010/main" val="2211779308"/>
+        <p14:creationId xmlns:p14="http://schemas.microsoft.com/office/powerpoint/2010/main" val="1638602942"/>
       </p:ext>
     </p:extLst>
   </p:cSld>
@@ -3774,15 +3704,15 @@
           <p:cNvPr id="2" name="Title 1">
             <a:extLst>
               <a:ext uri="{FF2B5EF4-FFF2-40B4-BE49-F238E27FC236}">
-                <a16:creationId xmlns:a16="http://schemas.microsoft.com/office/drawing/2014/main" id="{C0D22670-E4CE-4CFB-A077-D4D49C447DE9}"/>
-              </a:ext>
-            </a:extLst>
-          </p:cNvPr>
-          <p:cNvSpPr>
-            <a:spLocks noGrp="1"/>
-          </p:cNvSpPr>
-          <p:nvPr>
-            <p:ph type="title"/>
+                <a16:creationId xmlns:a16="http://schemas.microsoft.com/office/drawing/2014/main" id="{A5DECC40-98A4-4EBA-91B6-45BBAAEC9EA9}"/>
+              </a:ext>
+            </a:extLst>
+          </p:cNvPr>
+          <p:cNvSpPr>
+            <a:spLocks noGrp="1"/>
+          </p:cNvSpPr>
+          <p:nvPr>
+            <p:ph type="ctrTitle"/>
           </p:nvPr>
         </p:nvSpPr>
         <p:spPr/>
@@ -3796,18 +3726,18 @@
       </p:sp>
       <p:sp>
         <p:nvSpPr>
-          <p:cNvPr id="3" name="Content Placeholder 2">
-            <a:extLst>
-              <a:ext uri="{FF2B5EF4-FFF2-40B4-BE49-F238E27FC236}">
-                <a16:creationId xmlns:a16="http://schemas.microsoft.com/office/drawing/2014/main" id="{471D61F8-DBF6-45D6-AD46-BEDCBAEC665B}"/>
-              </a:ext>
-            </a:extLst>
-          </p:cNvPr>
-          <p:cNvSpPr>
-            <a:spLocks noGrp="1"/>
-          </p:cNvSpPr>
-          <p:nvPr>
-            <p:ph idx="1"/>
+          <p:cNvPr id="3" name="Subtitle 2">
+            <a:extLst>
+              <a:ext uri="{FF2B5EF4-FFF2-40B4-BE49-F238E27FC236}">
+                <a16:creationId xmlns:a16="http://schemas.microsoft.com/office/drawing/2014/main" id="{5629781D-B566-441B-B5B6-61445EFBD95F}"/>
+              </a:ext>
+            </a:extLst>
+          </p:cNvPr>
+          <p:cNvSpPr>
+            <a:spLocks noGrp="1"/>
+          </p:cNvSpPr>
+          <p:nvPr>
+            <p:ph type="subTitle" idx="1"/>
           </p:nvPr>
         </p:nvSpPr>
         <p:spPr/>
@@ -3821,10 +3751,10 @@
       </p:sp>
       <p:pic>
         <p:nvPicPr>
-          <p:cNvPr id="4" name="Picture 3">
-            <a:extLst>
-              <a:ext uri="{FF2B5EF4-FFF2-40B4-BE49-F238E27FC236}">
-                <a16:creationId xmlns:a16="http://schemas.microsoft.com/office/drawing/2014/main" id="{D57FF605-C0C4-4A6D-96FA-CD5B72D90D5E}"/>
+          <p:cNvPr id="5" name="Picture 4">
+            <a:extLst>
+              <a:ext uri="{FF2B5EF4-FFF2-40B4-BE49-F238E27FC236}">
+                <a16:creationId xmlns:a16="http://schemas.microsoft.com/office/drawing/2014/main" id="{02974C42-39BF-4053-94AC-F4E9D88D477E}"/>
               </a:ext>
             </a:extLst>
           </p:cNvPr>
@@ -3834,79 +3764,117 @@
           <p:nvPr/>
         </p:nvPicPr>
         <p:blipFill>
-          <a:blip r:embed="rId2"/>
+          <a:blip r:embed="rId2">
+            <a:extLst>
+              <a:ext uri="{28A0092B-C50C-407E-A947-70E740481C1C}">
+                <a14:useLocalDpi xmlns:a14="http://schemas.microsoft.com/office/drawing/2010/main" val="0"/>
+              </a:ext>
+            </a:extLst>
+          </a:blip>
           <a:stretch>
             <a:fillRect/>
           </a:stretch>
         </p:blipFill>
         <p:spPr>
           <a:xfrm>
-            <a:off x="830817" y="207297"/>
-            <a:ext cx="10530364" cy="6443405"/>
+            <a:off x="161188" y="178643"/>
+            <a:ext cx="10875322" cy="6662640"/>
           </a:xfrm>
           <a:prstGeom prst="rect">
             <a:avLst/>
           </a:prstGeom>
         </p:spPr>
       </p:pic>
-      <p:sp>
-        <p:nvSpPr>
-          <p:cNvPr id="5" name="Oval 4">
-            <a:extLst>
-              <a:ext uri="{FF2B5EF4-FFF2-40B4-BE49-F238E27FC236}">
-                <a16:creationId xmlns:a16="http://schemas.microsoft.com/office/drawing/2014/main" id="{4339488D-B61D-4F72-B3E4-B4874E8E14C9}"/>
-              </a:ext>
-            </a:extLst>
-          </p:cNvPr>
-          <p:cNvSpPr/>
+      <p:cxnSp>
+        <p:nvCxnSpPr>
+          <p:cNvPr id="9" name="Straight Connector 8">
+            <a:extLst>
+              <a:ext uri="{FF2B5EF4-FFF2-40B4-BE49-F238E27FC236}">
+                <a16:creationId xmlns:a16="http://schemas.microsoft.com/office/drawing/2014/main" id="{4CC1E0AA-0887-4C07-81A0-4546A2540C37}"/>
+              </a:ext>
+            </a:extLst>
+          </p:cNvPr>
+          <p:cNvCxnSpPr/>
           <p:nvPr/>
-        </p:nvSpPr>
-        <p:spPr>
-          <a:xfrm>
-            <a:off x="3971925" y="5257800"/>
-            <a:ext cx="1600200" cy="1054100"/>
-          </a:xfrm>
-          <a:prstGeom prst="ellipse">
+        </p:nvCxnSpPr>
+        <p:spPr>
+          <a:xfrm flipV="1">
+            <a:off x="9543495" y="1012054"/>
+            <a:ext cx="923278" cy="213064"/>
+          </a:xfrm>
+          <a:prstGeom prst="line">
             <a:avLst/>
           </a:prstGeom>
-          <a:noFill/>
           <a:ln w="38100">
             <a:solidFill>
-              <a:srgbClr val="FF0000"/>
+              <a:schemeClr val="tx1"/>
             </a:solidFill>
           </a:ln>
         </p:spPr>
         <p:style>
-          <a:lnRef idx="2">
-            <a:schemeClr val="accent1">
-              <a:shade val="50000"/>
-            </a:schemeClr>
+          <a:lnRef idx="1">
+            <a:schemeClr val="accent1"/>
           </a:lnRef>
-          <a:fillRef idx="1">
+          <a:fillRef idx="0">
             <a:schemeClr val="accent1"/>
           </a:fillRef>
           <a:effectRef idx="0">
             <a:schemeClr val="accent1"/>
           </a:effectRef>
           <a:fontRef idx="minor">
-            <a:schemeClr val="lt1"/>
+            <a:schemeClr val="tx1"/>
           </a:fontRef>
         </p:style>
-        <p:txBody>
-          <a:bodyPr rtlCol="0" anchor="ctr"/>
-          <a:lstStyle/>
-          <a:p>
-            <a:pPr algn="ctr"/>
-            <a:endParaRPr lang="en-US"/>
-          </a:p>
-        </p:txBody>
-      </p:sp>
-      <p:sp>
-        <p:nvSpPr>
-          <p:cNvPr id="6" name="TextBox 5">
-            <a:extLst>
-              <a:ext uri="{FF2B5EF4-FFF2-40B4-BE49-F238E27FC236}">
-                <a16:creationId xmlns:a16="http://schemas.microsoft.com/office/drawing/2014/main" id="{44DF30F3-668E-4CCC-ABFF-17263DC22A3E}"/>
+      </p:cxnSp>
+      <p:cxnSp>
+        <p:nvCxnSpPr>
+          <p:cNvPr id="10" name="Straight Connector 9">
+            <a:extLst>
+              <a:ext uri="{FF2B5EF4-FFF2-40B4-BE49-F238E27FC236}">
+                <a16:creationId xmlns:a16="http://schemas.microsoft.com/office/drawing/2014/main" id="{D9493C27-E6BC-44E3-BD27-AD183FE699B2}"/>
+              </a:ext>
+            </a:extLst>
+          </p:cNvPr>
+          <p:cNvCxnSpPr>
+            <a:cxnSpLocks/>
+          </p:cNvCxnSpPr>
+          <p:nvPr/>
+        </p:nvCxnSpPr>
+        <p:spPr>
+          <a:xfrm flipV="1">
+            <a:off x="10484528" y="178643"/>
+            <a:ext cx="612559" cy="833411"/>
+          </a:xfrm>
+          <a:prstGeom prst="line">
+            <a:avLst/>
+          </a:prstGeom>
+          <a:ln w="38100">
+            <a:solidFill>
+              <a:schemeClr val="tx1"/>
+            </a:solidFill>
+          </a:ln>
+        </p:spPr>
+        <p:style>
+          <a:lnRef idx="1">
+            <a:schemeClr val="accent1"/>
+          </a:lnRef>
+          <a:fillRef idx="0">
+            <a:schemeClr val="accent1"/>
+          </a:fillRef>
+          <a:effectRef idx="0">
+            <a:schemeClr val="accent1"/>
+          </a:effectRef>
+          <a:fontRef idx="minor">
+            <a:schemeClr val="tx1"/>
+          </a:fontRef>
+        </p:style>
+      </p:cxnSp>
+      <p:sp>
+        <p:nvSpPr>
+          <p:cNvPr id="12" name="TextBox 11">
+            <a:extLst>
+              <a:ext uri="{FF2B5EF4-FFF2-40B4-BE49-F238E27FC236}">
+                <a16:creationId xmlns:a16="http://schemas.microsoft.com/office/drawing/2014/main" id="{7FEE85ED-B909-48BD-AD1E-8A63C7405EC5}"/>
               </a:ext>
             </a:extLst>
           </p:cNvPr>
@@ -3915,8 +3883,8 @@
         </p:nvSpPr>
         <p:spPr>
           <a:xfrm>
-            <a:off x="5579508" y="5133975"/>
-            <a:ext cx="3414140" cy="461665"/>
+            <a:off x="9512247" y="1232465"/>
+            <a:ext cx="1256049" cy="369332"/>
           </a:xfrm>
           <a:prstGeom prst="rect">
             <a:avLst/>
@@ -3930,17 +3898,223 @@
           <a:lstStyle/>
           <a:p>
             <a:r>
-              <a:rPr lang="en-US" sz="2400" b="1" dirty="0"/>
-              <a:t>What constitutes a ‘site’?</a:t>
-            </a:r>
-            <a:endParaRPr lang="en-US" b="1" dirty="0"/>
+              <a:rPr lang="en-US" dirty="0">
+                <a:solidFill>
+                  <a:srgbClr val="FF0000"/>
+                </a:solidFill>
+              </a:rPr>
+              <a:t>a, intercept</a:t>
+            </a:r>
+          </a:p>
+        </p:txBody>
+      </p:sp>
+      <p:sp>
+        <p:nvSpPr>
+          <p:cNvPr id="13" name="TextBox 12">
+            <a:extLst>
+              <a:ext uri="{FF2B5EF4-FFF2-40B4-BE49-F238E27FC236}">
+                <a16:creationId xmlns:a16="http://schemas.microsoft.com/office/drawing/2014/main" id="{9065B989-CA45-47C8-9C4F-C23DC62E0779}"/>
+              </a:ext>
+            </a:extLst>
+          </p:cNvPr>
+          <p:cNvSpPr txBox="1"/>
+          <p:nvPr/>
+        </p:nvSpPr>
+        <p:spPr>
+          <a:xfrm>
+            <a:off x="9388890" y="726061"/>
+            <a:ext cx="877163" cy="369332"/>
+          </a:xfrm>
+          <a:prstGeom prst="rect">
+            <a:avLst/>
+          </a:prstGeom>
+          <a:noFill/>
+        </p:spPr>
+        <p:txBody>
+          <a:bodyPr wrap="none" rtlCol="0">
+            <a:spAutoFit/>
+          </a:bodyPr>
+          <a:lstStyle/>
+          <a:p>
+            <a:r>
+              <a:rPr lang="en-US" dirty="0">
+                <a:solidFill>
+                  <a:srgbClr val="FF0000"/>
+                </a:solidFill>
+              </a:rPr>
+              <a:t>Slope b</a:t>
+            </a:r>
+          </a:p>
+        </p:txBody>
+      </p:sp>
+      <p:sp>
+        <p:nvSpPr>
+          <p:cNvPr id="14" name="TextBox 13">
+            <a:extLst>
+              <a:ext uri="{FF2B5EF4-FFF2-40B4-BE49-F238E27FC236}">
+                <a16:creationId xmlns:a16="http://schemas.microsoft.com/office/drawing/2014/main" id="{74D5D087-E910-4641-801B-BE98D8629E42}"/>
+              </a:ext>
+            </a:extLst>
+          </p:cNvPr>
+          <p:cNvSpPr txBox="1"/>
+          <p:nvPr/>
+        </p:nvSpPr>
+        <p:spPr>
+          <a:xfrm>
+            <a:off x="10462443" y="188709"/>
+            <a:ext cx="853119" cy="369332"/>
+          </a:xfrm>
+          <a:prstGeom prst="rect">
+            <a:avLst/>
+          </a:prstGeom>
+          <a:noFill/>
+        </p:spPr>
+        <p:txBody>
+          <a:bodyPr wrap="none" rtlCol="0">
+            <a:spAutoFit/>
+          </a:bodyPr>
+          <a:lstStyle/>
+          <a:p>
+            <a:r>
+              <a:rPr lang="en-US" dirty="0">
+                <a:solidFill>
+                  <a:srgbClr val="FF0000"/>
+                </a:solidFill>
+              </a:rPr>
+              <a:t>Slope c</a:t>
+            </a:r>
+          </a:p>
+        </p:txBody>
+      </p:sp>
+      <p:sp>
+        <p:nvSpPr>
+          <p:cNvPr id="15" name="TextBox 14">
+            <a:extLst>
+              <a:ext uri="{FF2B5EF4-FFF2-40B4-BE49-F238E27FC236}">
+                <a16:creationId xmlns:a16="http://schemas.microsoft.com/office/drawing/2014/main" id="{B13EC12B-AA94-476A-B2A2-E17979CDBBA2}"/>
+              </a:ext>
+            </a:extLst>
+          </p:cNvPr>
+          <p:cNvSpPr txBox="1"/>
+          <p:nvPr/>
+        </p:nvSpPr>
+        <p:spPr>
+          <a:xfrm>
+            <a:off x="10484528" y="901952"/>
+            <a:ext cx="1504771" cy="369332"/>
+          </a:xfrm>
+          <a:prstGeom prst="rect">
+            <a:avLst/>
+          </a:prstGeom>
+          <a:noFill/>
+        </p:spPr>
+        <p:txBody>
+          <a:bodyPr wrap="none" rtlCol="0">
+            <a:spAutoFit/>
+          </a:bodyPr>
+          <a:lstStyle/>
+          <a:p>
+            <a:r>
+              <a:rPr lang="en-US" dirty="0" err="1">
+                <a:solidFill>
+                  <a:srgbClr val="FF0000"/>
+                </a:solidFill>
+              </a:rPr>
+              <a:t>xs</a:t>
+            </a:r>
+            <a:r>
+              <a:rPr lang="en-US" dirty="0">
+                <a:solidFill>
+                  <a:srgbClr val="FF0000"/>
+                </a:solidFill>
+              </a:rPr>
+              <a:t>, pivot point</a:t>
+            </a:r>
+          </a:p>
+        </p:txBody>
+      </p:sp>
+      <p:sp>
+        <p:nvSpPr>
+          <p:cNvPr id="16" name="TextBox 15">
+            <a:extLst>
+              <a:ext uri="{FF2B5EF4-FFF2-40B4-BE49-F238E27FC236}">
+                <a16:creationId xmlns:a16="http://schemas.microsoft.com/office/drawing/2014/main" id="{F6BAC719-C233-4CD7-9A29-F9B87D6A88B1}"/>
+              </a:ext>
+            </a:extLst>
+          </p:cNvPr>
+          <p:cNvSpPr txBox="1"/>
+          <p:nvPr/>
+        </p:nvSpPr>
+        <p:spPr>
+          <a:xfrm>
+            <a:off x="1729557" y="96505"/>
+            <a:ext cx="3613211" cy="369332"/>
+          </a:xfrm>
+          <a:prstGeom prst="rect">
+            <a:avLst/>
+          </a:prstGeom>
+          <a:noFill/>
+        </p:spPr>
+        <p:txBody>
+          <a:bodyPr wrap="square" rtlCol="0">
+            <a:spAutoFit/>
+          </a:bodyPr>
+          <a:lstStyle/>
+          <a:p>
+            <a:r>
+              <a:rPr lang="en-US" dirty="0">
+                <a:solidFill>
+                  <a:srgbClr val="FF0000"/>
+                </a:solidFill>
+              </a:rPr>
+              <a:t>intercept, leaching at 0N</a:t>
+            </a:r>
+          </a:p>
+        </p:txBody>
+      </p:sp>
+      <p:sp>
+        <p:nvSpPr>
+          <p:cNvPr id="17" name="TextBox 16">
+            <a:extLst>
+              <a:ext uri="{FF2B5EF4-FFF2-40B4-BE49-F238E27FC236}">
+                <a16:creationId xmlns:a16="http://schemas.microsoft.com/office/drawing/2014/main" id="{C4344367-6107-47B3-AEEA-8B33ED400C6B}"/>
+              </a:ext>
+            </a:extLst>
+          </p:cNvPr>
+          <p:cNvSpPr txBox="1"/>
+          <p:nvPr/>
+        </p:nvSpPr>
+        <p:spPr>
+          <a:xfrm>
+            <a:off x="7039725" y="52229"/>
+            <a:ext cx="1206356" cy="369332"/>
+          </a:xfrm>
+          <a:prstGeom prst="rect">
+            <a:avLst/>
+          </a:prstGeom>
+          <a:noFill/>
+        </p:spPr>
+        <p:txBody>
+          <a:bodyPr wrap="none" rtlCol="0">
+            <a:spAutoFit/>
+          </a:bodyPr>
+          <a:lstStyle/>
+          <a:p>
+            <a:r>
+              <a:rPr lang="en-US" dirty="0">
+                <a:solidFill>
+                  <a:srgbClr val="FF0000"/>
+                </a:solidFill>
+              </a:rPr>
+              <a:t>pivot point</a:t>
+            </a:r>
           </a:p>
         </p:txBody>
       </p:sp>
     </p:spTree>
     <p:extLst>
       <p:ext uri="{BB962C8B-B14F-4D97-AF65-F5344CB8AC3E}">
-        <p14:creationId xmlns:p14="http://schemas.microsoft.com/office/powerpoint/2010/main" val="3256452271"/>
+        <p14:creationId xmlns:p14="http://schemas.microsoft.com/office/powerpoint/2010/main" val="2211779308"/>
       </p:ext>
     </p:extLst>
   </p:cSld>
@@ -3972,7 +4146,7 @@
           <p:cNvPr id="2" name="Title 1">
             <a:extLst>
               <a:ext uri="{FF2B5EF4-FFF2-40B4-BE49-F238E27FC236}">
-                <a16:creationId xmlns:a16="http://schemas.microsoft.com/office/drawing/2014/main" id="{3224DF4D-0A71-4E47-B3D1-ECB8ED5D3726}"/>
+                <a16:creationId xmlns:a16="http://schemas.microsoft.com/office/drawing/2014/main" id="{C0D22670-E4CE-4CFB-A077-D4D49C447DE9}"/>
               </a:ext>
             </a:extLst>
           </p:cNvPr>
@@ -3981,6 +4155,31 @@
           </p:cNvSpPr>
           <p:nvPr>
             <p:ph type="title"/>
+          </p:nvPr>
+        </p:nvSpPr>
+        <p:spPr/>
+        <p:txBody>
+          <a:bodyPr/>
+          <a:lstStyle/>
+          <a:p>
+            <a:endParaRPr lang="en-US"/>
+          </a:p>
+        </p:txBody>
+      </p:sp>
+      <p:sp>
+        <p:nvSpPr>
+          <p:cNvPr id="3" name="Content Placeholder 2">
+            <a:extLst>
+              <a:ext uri="{FF2B5EF4-FFF2-40B4-BE49-F238E27FC236}">
+                <a16:creationId xmlns:a16="http://schemas.microsoft.com/office/drawing/2014/main" id="{471D61F8-DBF6-45D6-AD46-BEDCBAEC665B}"/>
+              </a:ext>
+            </a:extLst>
+          </p:cNvPr>
+          <p:cNvSpPr>
+            <a:spLocks noGrp="1"/>
+          </p:cNvSpPr>
+          <p:nvPr>
+            <p:ph idx="1"/>
           </p:nvPr>
         </p:nvSpPr>
         <p:spPr/>
@@ -3994,44 +4193,40 @@
       </p:sp>
       <p:pic>
         <p:nvPicPr>
-          <p:cNvPr id="5" name="Content Placeholder 4">
-            <a:extLst>
-              <a:ext uri="{FF2B5EF4-FFF2-40B4-BE49-F238E27FC236}">
-                <a16:creationId xmlns:a16="http://schemas.microsoft.com/office/drawing/2014/main" id="{29AB5448-DB6B-4212-8A08-8E1A1541E108}"/>
+          <p:cNvPr id="4" name="Picture 3">
+            <a:extLst>
+              <a:ext uri="{FF2B5EF4-FFF2-40B4-BE49-F238E27FC236}">
+                <a16:creationId xmlns:a16="http://schemas.microsoft.com/office/drawing/2014/main" id="{D57FF605-C0C4-4A6D-96FA-CD5B72D90D5E}"/>
               </a:ext>
             </a:extLst>
           </p:cNvPr>
           <p:cNvPicPr>
-            <a:picLocks noGrp="1" noChangeAspect="1"/>
+            <a:picLocks noChangeAspect="1"/>
           </p:cNvPicPr>
-          <p:nvPr>
-            <p:ph idx="1"/>
-          </p:nvPr>
+          <p:nvPr/>
         </p:nvPicPr>
-        <p:blipFill rotWithShape="1">
-          <a:blip r:embed="rId2">
-            <a:extLst>
-              <a:ext uri="{28A0092B-C50C-407E-A947-70E740481C1C}">
-                <a14:useLocalDpi xmlns:a14="http://schemas.microsoft.com/office/drawing/2010/main" val="0"/>
-              </a:ext>
-            </a:extLst>
-          </a:blip>
-          <a:srcRect r="45590"/>
-          <a:stretch/>
+        <p:blipFill>
+          <a:blip r:embed="rId2"/>
+          <a:stretch>
+            <a:fillRect/>
+          </a:stretch>
         </p:blipFill>
         <p:spPr>
           <a:xfrm>
-            <a:off x="959885" y="365125"/>
-            <a:ext cx="5640940" cy="6455131"/>
-          </a:xfrm>
+            <a:off x="830817" y="207297"/>
+            <a:ext cx="10530364" cy="6443405"/>
+          </a:xfrm>
+          <a:prstGeom prst="rect">
+            <a:avLst/>
+          </a:prstGeom>
         </p:spPr>
       </p:pic>
       <p:sp>
         <p:nvSpPr>
-          <p:cNvPr id="6" name="Oval 5">
-            <a:extLst>
-              <a:ext uri="{FF2B5EF4-FFF2-40B4-BE49-F238E27FC236}">
-                <a16:creationId xmlns:a16="http://schemas.microsoft.com/office/drawing/2014/main" id="{553F95EC-0FEE-426F-919F-3353EE4DF81A}"/>
+          <p:cNvPr id="5" name="Oval 4">
+            <a:extLst>
+              <a:ext uri="{FF2B5EF4-FFF2-40B4-BE49-F238E27FC236}">
+                <a16:creationId xmlns:a16="http://schemas.microsoft.com/office/drawing/2014/main" id="{4339488D-B61D-4F72-B3E4-B4874E8E14C9}"/>
               </a:ext>
             </a:extLst>
           </p:cNvPr>
@@ -4040,16 +4235,16 @@
         </p:nvSpPr>
         <p:spPr>
           <a:xfrm>
-            <a:off x="5353050" y="1238250"/>
-            <a:ext cx="990600" cy="2286000"/>
+            <a:off x="3971925" y="5257800"/>
+            <a:ext cx="1600200" cy="1054100"/>
           </a:xfrm>
           <a:prstGeom prst="ellipse">
             <a:avLst/>
           </a:prstGeom>
           <a:noFill/>
-          <a:ln w="76200">
+          <a:ln w="38100">
             <a:solidFill>
-              <a:schemeClr val="accent1"/>
+              <a:srgbClr val="FF0000"/>
             </a:solidFill>
           </a:ln>
         </p:spPr>
@@ -4080,10 +4275,10 @@
       </p:sp>
       <p:sp>
         <p:nvSpPr>
-          <p:cNvPr id="7" name="TextBox 6">
-            <a:extLst>
-              <a:ext uri="{FF2B5EF4-FFF2-40B4-BE49-F238E27FC236}">
-                <a16:creationId xmlns:a16="http://schemas.microsoft.com/office/drawing/2014/main" id="{3DACA3A5-D070-4611-824E-FAD9A5435255}"/>
+          <p:cNvPr id="6" name="TextBox 5">
+            <a:extLst>
+              <a:ext uri="{FF2B5EF4-FFF2-40B4-BE49-F238E27FC236}">
+                <a16:creationId xmlns:a16="http://schemas.microsoft.com/office/drawing/2014/main" id="{44DF30F3-668E-4CCC-ABFF-17263DC22A3E}"/>
               </a:ext>
             </a:extLst>
           </p:cNvPr>
@@ -4092,8 +4287,8 @@
         </p:nvSpPr>
         <p:spPr>
           <a:xfrm>
-            <a:off x="7119891" y="2352583"/>
-            <a:ext cx="4797917" cy="369332"/>
+            <a:off x="5579508" y="5133975"/>
+            <a:ext cx="3414140" cy="461665"/>
           </a:xfrm>
           <a:prstGeom prst="rect">
             <a:avLst/>
@@ -4107,16 +4302,17 @@
           <a:lstStyle/>
           <a:p>
             <a:r>
-              <a:rPr lang="en-US" dirty="0"/>
-              <a:t>A continuous corn penalty needs to be modelled.</a:t>
-            </a:r>
+              <a:rPr lang="en-US" sz="2400" b="1" dirty="0"/>
+              <a:t>What constitutes a ‘site’?</a:t>
+            </a:r>
+            <a:endParaRPr lang="en-US" b="1" dirty="0"/>
           </a:p>
         </p:txBody>
       </p:sp>
     </p:spTree>
     <p:extLst>
       <p:ext uri="{BB962C8B-B14F-4D97-AF65-F5344CB8AC3E}">
-        <p14:creationId xmlns:p14="http://schemas.microsoft.com/office/powerpoint/2010/main" val="3515632793"/>
+        <p14:creationId xmlns:p14="http://schemas.microsoft.com/office/powerpoint/2010/main" val="3256452271"/>
       </p:ext>
     </p:extLst>
   </p:cSld>
@@ -4148,7 +4344,7 @@
           <p:cNvPr id="2" name="Title 1">
             <a:extLst>
               <a:ext uri="{FF2B5EF4-FFF2-40B4-BE49-F238E27FC236}">
-                <a16:creationId xmlns:a16="http://schemas.microsoft.com/office/drawing/2014/main" id="{CC449B6E-F899-4672-A711-B85B8B0AB394}"/>
+                <a16:creationId xmlns:a16="http://schemas.microsoft.com/office/drawing/2014/main" id="{3224DF4D-0A71-4E47-B3D1-ECB8ED5D3726}"/>
               </a:ext>
             </a:extLst>
           </p:cNvPr>
@@ -4170,10 +4366,10 @@
       </p:sp>
       <p:pic>
         <p:nvPicPr>
-          <p:cNvPr id="5" name="Content Placeholder 4" descr="A screenshot of a cell phone&#10;&#10;Description automatically generated">
-            <a:extLst>
-              <a:ext uri="{FF2B5EF4-FFF2-40B4-BE49-F238E27FC236}">
-                <a16:creationId xmlns:a16="http://schemas.microsoft.com/office/drawing/2014/main" id="{86298AA6-A441-43BE-ACD3-7D0E74D4986D}"/>
+          <p:cNvPr id="5" name="Content Placeholder 4">
+            <a:extLst>
+              <a:ext uri="{FF2B5EF4-FFF2-40B4-BE49-F238E27FC236}">
+                <a16:creationId xmlns:a16="http://schemas.microsoft.com/office/drawing/2014/main" id="{29AB5448-DB6B-4212-8A08-8E1A1541E108}"/>
               </a:ext>
             </a:extLst>
           </p:cNvPr>
@@ -4184,7 +4380,7 @@
             <p:ph idx="1"/>
           </p:nvPr>
         </p:nvPicPr>
-        <p:blipFill>
+        <p:blipFill rotWithShape="1">
           <a:blip r:embed="rId2">
             <a:extLst>
               <a:ext uri="{28A0092B-C50C-407E-A947-70E740481C1C}">
@@ -4192,21 +4388,107 @@
               </a:ext>
             </a:extLst>
           </a:blip>
-          <a:stretch>
-            <a:fillRect/>
-          </a:stretch>
+          <a:srcRect r="45590"/>
+          <a:stretch/>
         </p:blipFill>
         <p:spPr>
           <a:xfrm>
-            <a:off x="3096417" y="243603"/>
-            <a:ext cx="5999165" cy="6370794"/>
+            <a:off x="959885" y="365125"/>
+            <a:ext cx="5640940" cy="6455131"/>
           </a:xfrm>
         </p:spPr>
       </p:pic>
+      <p:sp>
+        <p:nvSpPr>
+          <p:cNvPr id="6" name="Oval 5">
+            <a:extLst>
+              <a:ext uri="{FF2B5EF4-FFF2-40B4-BE49-F238E27FC236}">
+                <a16:creationId xmlns:a16="http://schemas.microsoft.com/office/drawing/2014/main" id="{553F95EC-0FEE-426F-919F-3353EE4DF81A}"/>
+              </a:ext>
+            </a:extLst>
+          </p:cNvPr>
+          <p:cNvSpPr/>
+          <p:nvPr/>
+        </p:nvSpPr>
+        <p:spPr>
+          <a:xfrm>
+            <a:off x="5353050" y="1238250"/>
+            <a:ext cx="990600" cy="2286000"/>
+          </a:xfrm>
+          <a:prstGeom prst="ellipse">
+            <a:avLst/>
+          </a:prstGeom>
+          <a:noFill/>
+          <a:ln w="76200">
+            <a:solidFill>
+              <a:schemeClr val="accent1"/>
+            </a:solidFill>
+          </a:ln>
+        </p:spPr>
+        <p:style>
+          <a:lnRef idx="2">
+            <a:schemeClr val="accent1">
+              <a:shade val="50000"/>
+            </a:schemeClr>
+          </a:lnRef>
+          <a:fillRef idx="1">
+            <a:schemeClr val="accent1"/>
+          </a:fillRef>
+          <a:effectRef idx="0">
+            <a:schemeClr val="accent1"/>
+          </a:effectRef>
+          <a:fontRef idx="minor">
+            <a:schemeClr val="lt1"/>
+          </a:fontRef>
+        </p:style>
+        <p:txBody>
+          <a:bodyPr rtlCol="0" anchor="ctr"/>
+          <a:lstStyle/>
+          <a:p>
+            <a:pPr algn="ctr"/>
+            <a:endParaRPr lang="en-US"/>
+          </a:p>
+        </p:txBody>
+      </p:sp>
+      <p:sp>
+        <p:nvSpPr>
+          <p:cNvPr id="7" name="TextBox 6">
+            <a:extLst>
+              <a:ext uri="{FF2B5EF4-FFF2-40B4-BE49-F238E27FC236}">
+                <a16:creationId xmlns:a16="http://schemas.microsoft.com/office/drawing/2014/main" id="{3DACA3A5-D070-4611-824E-FAD9A5435255}"/>
+              </a:ext>
+            </a:extLst>
+          </p:cNvPr>
+          <p:cNvSpPr txBox="1"/>
+          <p:nvPr/>
+        </p:nvSpPr>
+        <p:spPr>
+          <a:xfrm>
+            <a:off x="7119891" y="2352583"/>
+            <a:ext cx="4797917" cy="369332"/>
+          </a:xfrm>
+          <a:prstGeom prst="rect">
+            <a:avLst/>
+          </a:prstGeom>
+          <a:noFill/>
+        </p:spPr>
+        <p:txBody>
+          <a:bodyPr wrap="none" rtlCol="0">
+            <a:spAutoFit/>
+          </a:bodyPr>
+          <a:lstStyle/>
+          <a:p>
+            <a:r>
+              <a:rPr lang="en-US" dirty="0"/>
+              <a:t>A continuous corn penalty needs to be modelled.</a:t>
+            </a:r>
+          </a:p>
+        </p:txBody>
+      </p:sp>
     </p:spTree>
     <p:extLst>
       <p:ext uri="{BB962C8B-B14F-4D97-AF65-F5344CB8AC3E}">
-        <p14:creationId xmlns:p14="http://schemas.microsoft.com/office/powerpoint/2010/main" val="1739499616"/>
+        <p14:creationId xmlns:p14="http://schemas.microsoft.com/office/powerpoint/2010/main" val="3515632793"/>
       </p:ext>
     </p:extLst>
   </p:cSld>
@@ -4238,7 +4520,7 @@
           <p:cNvPr id="2" name="Title 1">
             <a:extLst>
               <a:ext uri="{FF2B5EF4-FFF2-40B4-BE49-F238E27FC236}">
-                <a16:creationId xmlns:a16="http://schemas.microsoft.com/office/drawing/2014/main" id="{321F04DA-2EC9-4B9A-85E7-47AFA547EB12}"/>
+                <a16:creationId xmlns:a16="http://schemas.microsoft.com/office/drawing/2014/main" id="{CC449B6E-F899-4672-A711-B85B8B0AB394}"/>
               </a:ext>
             </a:extLst>
           </p:cNvPr>
@@ -4263,7 +4545,7 @@
           <p:cNvPr id="5" name="Content Placeholder 4" descr="A screenshot of a cell phone&#10;&#10;Description automatically generated">
             <a:extLst>
               <a:ext uri="{FF2B5EF4-FFF2-40B4-BE49-F238E27FC236}">
-                <a16:creationId xmlns:a16="http://schemas.microsoft.com/office/drawing/2014/main" id="{860A9A5F-2257-4EB8-9D9E-D32C7D357FD8}"/>
+                <a16:creationId xmlns:a16="http://schemas.microsoft.com/office/drawing/2014/main" id="{86298AA6-A441-43BE-ACD3-7D0E74D4986D}"/>
               </a:ext>
             </a:extLst>
           </p:cNvPr>
@@ -4288,15 +4570,15 @@
         </p:blipFill>
         <p:spPr>
           <a:xfrm>
-            <a:off x="1388126" y="533184"/>
-            <a:ext cx="9415747" cy="5791631"/>
+            <a:off x="3096417" y="243603"/>
+            <a:ext cx="5999165" cy="6370794"/>
           </a:xfrm>
         </p:spPr>
       </p:pic>
     </p:spTree>
     <p:extLst>
       <p:ext uri="{BB962C8B-B14F-4D97-AF65-F5344CB8AC3E}">
-        <p14:creationId xmlns:p14="http://schemas.microsoft.com/office/powerpoint/2010/main" val="1085140342"/>
+        <p14:creationId xmlns:p14="http://schemas.microsoft.com/office/powerpoint/2010/main" val="1739499616"/>
       </p:ext>
     </p:extLst>
   </p:cSld>
@@ -4328,6 +4610,96 @@
           <p:cNvPr id="2" name="Title 1">
             <a:extLst>
               <a:ext uri="{FF2B5EF4-FFF2-40B4-BE49-F238E27FC236}">
+                <a16:creationId xmlns:a16="http://schemas.microsoft.com/office/drawing/2014/main" id="{321F04DA-2EC9-4B9A-85E7-47AFA547EB12}"/>
+              </a:ext>
+            </a:extLst>
+          </p:cNvPr>
+          <p:cNvSpPr>
+            <a:spLocks noGrp="1"/>
+          </p:cNvSpPr>
+          <p:nvPr>
+            <p:ph type="title"/>
+          </p:nvPr>
+        </p:nvSpPr>
+        <p:spPr/>
+        <p:txBody>
+          <a:bodyPr/>
+          <a:lstStyle/>
+          <a:p>
+            <a:endParaRPr lang="en-US"/>
+          </a:p>
+        </p:txBody>
+      </p:sp>
+      <p:pic>
+        <p:nvPicPr>
+          <p:cNvPr id="5" name="Content Placeholder 4" descr="A screenshot of a cell phone&#10;&#10;Description automatically generated">
+            <a:extLst>
+              <a:ext uri="{FF2B5EF4-FFF2-40B4-BE49-F238E27FC236}">
+                <a16:creationId xmlns:a16="http://schemas.microsoft.com/office/drawing/2014/main" id="{860A9A5F-2257-4EB8-9D9E-D32C7D357FD8}"/>
+              </a:ext>
+            </a:extLst>
+          </p:cNvPr>
+          <p:cNvPicPr>
+            <a:picLocks noGrp="1" noChangeAspect="1"/>
+          </p:cNvPicPr>
+          <p:nvPr>
+            <p:ph idx="1"/>
+          </p:nvPr>
+        </p:nvPicPr>
+        <p:blipFill>
+          <a:blip r:embed="rId2">
+            <a:extLst>
+              <a:ext uri="{28A0092B-C50C-407E-A947-70E740481C1C}">
+                <a14:useLocalDpi xmlns:a14="http://schemas.microsoft.com/office/drawing/2010/main" val="0"/>
+              </a:ext>
+            </a:extLst>
+          </a:blip>
+          <a:stretch>
+            <a:fillRect/>
+          </a:stretch>
+        </p:blipFill>
+        <p:spPr>
+          <a:xfrm>
+            <a:off x="1388126" y="533184"/>
+            <a:ext cx="9415747" cy="5791631"/>
+          </a:xfrm>
+        </p:spPr>
+      </p:pic>
+    </p:spTree>
+    <p:extLst>
+      <p:ext uri="{BB962C8B-B14F-4D97-AF65-F5344CB8AC3E}">
+        <p14:creationId xmlns:p14="http://schemas.microsoft.com/office/powerpoint/2010/main" val="1085140342"/>
+      </p:ext>
+    </p:extLst>
+  </p:cSld>
+  <p:clrMapOvr>
+    <a:masterClrMapping/>
+  </p:clrMapOvr>
+</p:sld>
+</file>
+
+<file path=ppt/slides/slide7.xml><?xml version="1.0" encoding="utf-8"?>
+<p:sld xmlns:a="http://schemas.openxmlformats.org/drawingml/2006/main" xmlns:r="http://schemas.openxmlformats.org/officeDocument/2006/relationships" xmlns:p="http://schemas.openxmlformats.org/presentationml/2006/main">
+  <p:cSld>
+    <p:spTree>
+      <p:nvGrpSpPr>
+        <p:cNvPr id="1" name=""/>
+        <p:cNvGrpSpPr/>
+        <p:nvPr/>
+      </p:nvGrpSpPr>
+      <p:grpSpPr>
+        <a:xfrm>
+          <a:off x="0" y="0"/>
+          <a:ext cx="0" cy="0"/>
+          <a:chOff x="0" y="0"/>
+          <a:chExt cx="0" cy="0"/>
+        </a:xfrm>
+      </p:grpSpPr>
+      <p:sp>
+        <p:nvSpPr>
+          <p:cNvPr id="2" name="Title 1">
+            <a:extLst>
+              <a:ext uri="{FF2B5EF4-FFF2-40B4-BE49-F238E27FC236}">
                 <a16:creationId xmlns:a16="http://schemas.microsoft.com/office/drawing/2014/main" id="{EA12C77C-9D84-4DFC-92A1-B1A8DCCA4D46}"/>
               </a:ext>
             </a:extLst>
@@ -4432,7 +4804,7 @@
 </p:sld>
 </file>
 
-<file path=ppt/slides/slide7.xml><?xml version="1.0" encoding="utf-8"?>
+<file path=ppt/slides/slide8.xml><?xml version="1.0" encoding="utf-8"?>
 <p:sld xmlns:a="http://schemas.openxmlformats.org/drawingml/2006/main" xmlns:r="http://schemas.openxmlformats.org/officeDocument/2006/relationships" xmlns:p="http://schemas.openxmlformats.org/presentationml/2006/main">
   <p:cSld>
     <p:spTree>

</xml_diff>